<commit_message>
Actualización presentación y analisis reto 2
</commit_message>
<xml_diff>
--- a/Equip_A/results/Marketing y Comunicación/Desafio2_Marketing.pptx
+++ b/Equip_A/results/Marketing y Comunicación/Desafio2_Marketing.pptx
@@ -351,7 +351,7 @@
             <a:pPr indent="0" algn="r">
               <a:buNone/>
             </a:pPr>
-            <a:fld id="{1116D0FB-BB8D-4CDC-8906-B91BB9DE10F7}" type="slidenum">
+            <a:fld id="{A2866742-0E6C-47B6-8765-3A542B838CBD}" type="slidenum">
               <a:rPr b="0" lang="es-ES" sz="1400" spc="-1" strike="noStrike">
                 <a:solidFill>
                   <a:srgbClr val="000000"/>
@@ -730,7 +730,7 @@
                 <a:tab algn="l" pos="0"/>
               </a:tabLst>
             </a:pPr>
-            <a:fld id="{DA368959-8EF2-4A0E-AB07-E0C5643BF8CB}" type="slidenum">
+            <a:fld id="{AF9D57D9-BA23-4562-8C67-B18F8CCE00C6}" type="slidenum">
               <a:rPr b="0" lang="id-ID" sz="1200" spc="-1" strike="noStrike">
                 <a:solidFill>
                   <a:schemeClr val="dk1"/>
@@ -8803,7 +8803,7 @@
                 </a:solidFill>
                 <a:latin typeface="Calibri"/>
               </a:rPr>
-              <a:t>14</a:t>
+              <a:t>1</a:t>
             </a:r>
             <a:endParaRPr b="0" lang="es-ES" sz="1100" spc="-1" strike="noStrike">
               <a:solidFill>
@@ -9799,7 +9799,7 @@
                 </a:solidFill>
                 <a:latin typeface="Calibri"/>
               </a:rPr>
-              <a:t>12</a:t>
+              <a:t>2</a:t>
             </a:r>
             <a:endParaRPr b="0" lang="es-ES" sz="1100" spc="-1" strike="noStrike">
               <a:solidFill>
@@ -10263,7 +10263,7 @@
         </p:nvSpPr>
         <p:spPr>
           <a:xfrm>
-            <a:off x="3695760" y="5011200"/>
+            <a:off x="3729600" y="5193000"/>
             <a:ext cx="3989160" cy="1245960"/>
           </a:xfrm>
           <a:prstGeom prst="roundRect">
@@ -10315,8 +10315,18 @@
                   <a:srgbClr val="000000"/>
                 </a:solidFill>
                 <a:latin typeface="Calibri"/>
-              </a:rPr>
-              <a:t>El contacto for telefono fijo conviete mejor que el móvil </a:t>
+                <a:ea typeface="Microsoft YaHei"/>
+              </a:rPr>
+              <a:t>El contacto por móvil convierte mejor que el </a:t>
+            </a:r>
+            <a:r>
+              <a:rPr b="0" lang="es-ES" sz="1200" spc="-1" strike="noStrike">
+                <a:solidFill>
+                  <a:srgbClr val="000000"/>
+                </a:solidFill>
+                <a:latin typeface="Calibri"/>
+              </a:rPr>
+              <a:t>teléfono fijo </a:t>
             </a:r>
             <a:endParaRPr b="0" lang="es-ES" sz="1200" spc="-1" strike="noStrike">
               <a:solidFill>
@@ -10409,7 +10419,7 @@
                 </a:solidFill>
                 <a:latin typeface="Calibri"/>
               </a:rPr>
-              <a:t>11</a:t>
+              <a:t>3</a:t>
             </a:r>
             <a:endParaRPr b="0" lang="es-ES" sz="1100" spc="-1" strike="noStrike">
               <a:solidFill>
@@ -10719,7 +10729,7 @@
         </p:blipFill>
         <p:spPr>
           <a:xfrm>
-            <a:off x="6456960" y="1504800"/>
+            <a:off x="6590160" y="1450800"/>
             <a:ext cx="4289760" cy="3626640"/>
           </a:xfrm>
           <a:prstGeom prst="rect">
@@ -11110,7 +11120,7 @@
                 </a:solidFill>
                 <a:latin typeface="Calibri"/>
               </a:rPr>
-              <a:t>13</a:t>
+              <a:t>4</a:t>
             </a:r>
             <a:endParaRPr b="0" lang="es-ES" sz="1100" spc="-1" strike="noStrike">
               <a:solidFill>
@@ -11692,7 +11702,7 @@
                 </a:solidFill>
                 <a:latin typeface="Calibri"/>
               </a:rPr>
-              <a:t>11</a:t>
+              <a:t>5</a:t>
             </a:r>
             <a:endParaRPr b="0" lang="es-ES" sz="1100" spc="-1" strike="noStrike">
               <a:solidFill>
@@ -12290,7 +12300,7 @@
                 </a:solidFill>
                 <a:latin typeface="Calibri"/>
               </a:rPr>
-              <a:t>11</a:t>
+              <a:t>6</a:t>
             </a:r>
             <a:endParaRPr b="0" lang="es-ES" sz="1100" spc="-1" strike="noStrike">
               <a:solidFill>
@@ -12631,7 +12641,7 @@
                 </a:solidFill>
                 <a:latin typeface="Arial"/>
               </a:rPr>
-              <a:t>Aunque parece que convierte algo peor es mejor utilizar el tipo de contacto que prefiera el cliente </a:t>
+              <a:t>Aunque parece que convierte algo mejor el móvil es mejor utilizar el tipo de contacto que prefiera el cliente </a:t>
             </a:r>
             <a:endParaRPr b="0" lang="es-ES" sz="1800" spc="-1" strike="noStrike">
               <a:solidFill>

</xml_diff>